<commit_message>
Revising for updated vm
</commit_message>
<xml_diff>
--- a/pre-requisite lab/images/DeepLearningWorkshopArchitecture.pptx
+++ b/pre-requisite lab/images/DeepLearningWorkshopArchitecture.pptx
@@ -5,7 +5,7 @@
     <p:sldMasterId id="2147483648" r:id="rId1"/>
   </p:sldMasterIdLst>
   <p:sldIdLst>
-    <p:sldId id="296" r:id="rId2"/>
+    <p:sldId id="297" r:id="rId2"/>
   </p:sldIdLst>
   <p:sldSz cx="12192000" cy="6858000"/>
   <p:notesSz cx="6858000" cy="9144000"/>
@@ -18,14 +18,14 @@
       <p:boldItalic r:id="rId6"/>
     </p:embeddedFont>
     <p:embeddedFont>
-      <p:font typeface="Segoe UI Black" panose="020B0A02040204020203" pitchFamily="34" charset="0"/>
-      <p:bold r:id="rId7"/>
-      <p:boldItalic r:id="rId8"/>
+      <p:font typeface="Segoe UI Light" panose="020B0502040204020203" pitchFamily="34" charset="0"/>
+      <p:regular r:id="rId7"/>
+      <p:italic r:id="rId8"/>
     </p:embeddedFont>
     <p:embeddedFont>
-      <p:font typeface="Segoe UI Light" panose="020B0502040204020203" pitchFamily="34" charset="0"/>
-      <p:regular r:id="rId9"/>
-      <p:italic r:id="rId10"/>
+      <p:font typeface="Segoe UI Black" panose="020B0A02040204020203" pitchFamily="34" charset="0"/>
+      <p:bold r:id="rId9"/>
+      <p:boldItalic r:id="rId10"/>
     </p:embeddedFont>
   </p:embeddedFontLst>
   <p:defaultTextStyle>
@@ -19318,9 +19318,9 @@
           <p:grpSpPr>
             <a:xfrm>
               <a:off x="3706333" y="594929"/>
-              <a:ext cx="1393710" cy="699769"/>
+              <a:ext cx="1202954" cy="524827"/>
               <a:chOff x="3706333" y="594929"/>
-              <a:chExt cx="1393710" cy="699769"/>
+              <a:chExt cx="1202954" cy="524827"/>
             </a:xfrm>
           </p:grpSpPr>
           <p:sp>
@@ -19332,7 +19332,7 @@
             <p:spPr>
               <a:xfrm>
                 <a:off x="4123494" y="594929"/>
-                <a:ext cx="976549" cy="699769"/>
+                <a:ext cx="785793" cy="524827"/>
               </a:xfrm>
               <a:prstGeom prst="rect">
                 <a:avLst/>
@@ -19355,11 +19355,8 @@
                 </a:br>
                 <a:r>
                   <a:rPr lang="en-US" sz="1200" kern="0" dirty="0"/>
-                  <a:t>Data Region</a:t>
+                  <a:t>Location</a:t>
                 </a:r>
-                <a:br>
-                  <a:rPr lang="en-US" sz="1200" kern="0" dirty="0"/>
-                </a:br>
                 <a:endParaRPr lang="en-US" sz="1200" b="1" kern="0" dirty="0"/>
               </a:p>
             </p:txBody>
@@ -21017,9 +21014,9 @@
           <p:grpSpPr>
             <a:xfrm>
               <a:off x="5391020" y="170692"/>
-              <a:ext cx="2038304" cy="437974"/>
+              <a:ext cx="1695165" cy="437974"/>
               <a:chOff x="5329096" y="135476"/>
-              <a:chExt cx="2038304" cy="437974"/>
+              <a:chExt cx="1695165" cy="437974"/>
             </a:xfrm>
           </p:grpSpPr>
           <p:grpSp>
@@ -21806,7 +21803,7 @@
             <p:spPr>
               <a:xfrm>
                 <a:off x="5634085" y="135476"/>
-                <a:ext cx="1733315" cy="437974"/>
+                <a:ext cx="1390176" cy="437974"/>
               </a:xfrm>
               <a:prstGeom prst="rect">
                 <a:avLst/>
@@ -21820,14 +21817,6 @@
               <a:lstStyle/>
               <a:p>
                 <a:pPr defTabSz="932597"/>
-                <a:r>
-                  <a:rPr lang="en-US" b="1" kern="0" dirty="0" err="1">
-                    <a:solidFill>
-                      <a:sysClr val="windowText" lastClr="000000"/>
-                    </a:solidFill>
-                  </a:rPr>
-                  <a:t>dlirw</a:t>
-                </a:r>
                 <a:r>
                   <a:rPr lang="en-US" b="1" i="1" kern="0" dirty="0">
                     <a:solidFill>
@@ -26933,23 +26922,19 @@
           <a:lstStyle/>
           <a:p>
             <a:r>
-              <a:rPr lang="en-US" sz="1600" b="1" dirty="0" err="1"/>
-              <a:t>dlirw</a:t>
+              <a:rPr lang="en-US" sz="1600" b="1" i="1" dirty="0"/>
+              <a:t>&lt;name&gt;</a:t>
             </a:r>
             <a:r>
               <a:rPr lang="en-US" sz="1600" b="1" dirty="0"/>
-              <a:t>&lt;name&gt;-storage</a:t>
+              <a:t>storage</a:t>
             </a:r>
             <a:br>
               <a:rPr lang="en-US" sz="1600" b="1" dirty="0"/>
             </a:br>
             <a:r>
-              <a:rPr lang="en-US" sz="1200" b="1" dirty="0" err="1"/>
-              <a:t>storage</a:t>
-            </a:r>
-            <a:r>
               <a:rPr lang="en-US" sz="1200" b="1" dirty="0"/>
-              <a:t> account</a:t>
+              <a:t>storage account</a:t>
             </a:r>
             <a:endParaRPr lang="en-US" sz="2000" b="1" dirty="0"/>
           </a:p>
@@ -27279,12 +27264,8 @@
           <a:lstStyle/>
           <a:p>
             <a:r>
-              <a:rPr lang="en-US" sz="1600" b="1" dirty="0" err="1"/>
-              <a:t>dlirw</a:t>
-            </a:r>
-            <a:r>
               <a:rPr lang="en-US" sz="1600" b="1" i="1" dirty="0"/>
-              <a:t>&lt;name&gt;-</a:t>
+              <a:t>&lt;name&gt;</a:t>
             </a:r>
             <a:r>
               <a:rPr lang="en-US" sz="1600" b="1" dirty="0" err="1"/>
@@ -27767,12 +27748,8 @@
           <a:lstStyle/>
           <a:p>
             <a:r>
-              <a:rPr lang="en-US" sz="1600" b="1" dirty="0" err="1"/>
-              <a:t>dlirw</a:t>
-            </a:r>
-            <a:r>
-              <a:rPr lang="en-US" sz="1600" b="1" dirty="0"/>
-              <a:t>&lt;name&gt;-</a:t>
+              <a:rPr lang="en-US" sz="1600" b="1" i="1" dirty="0"/>
+              <a:t>&lt;name&gt;</a:t>
             </a:r>
             <a:r>
               <a:rPr lang="en-US" sz="1600" b="1" dirty="0" err="1"/>
@@ -28470,12 +28447,8 @@
           <a:lstStyle/>
           <a:p>
             <a:r>
-              <a:rPr lang="en-US" sz="1600" b="1" dirty="0" err="1"/>
-              <a:t>dlirw</a:t>
-            </a:r>
-            <a:r>
               <a:rPr lang="en-US" sz="1600" b="1" i="1" dirty="0"/>
-              <a:t>&lt;name&gt;-</a:t>
+              <a:t>&lt;name&gt;</a:t>
             </a:r>
             <a:r>
               <a:rPr lang="en-US" sz="1600" b="1" dirty="0" err="1"/>
@@ -28604,12 +28577,8 @@
           <a:lstStyle/>
           <a:p>
             <a:r>
-              <a:rPr lang="en-US" sz="1600" b="1" dirty="0" err="1"/>
-              <a:t>dlirw</a:t>
-            </a:r>
-            <a:r>
               <a:rPr lang="en-US" sz="1600" b="1" i="1" dirty="0"/>
-              <a:t>&lt;name&gt;-</a:t>
+              <a:t>&lt;name&gt;</a:t>
             </a:r>
             <a:r>
               <a:rPr lang="en-US" sz="1600" b="1" dirty="0" err="1"/>
@@ -29228,22 +29197,6 @@
           </a:bodyPr>
           <a:lstStyle/>
           <a:p>
-            <a:r>
-              <a:rPr lang="en-US" sz="1200" dirty="0"/>
-              <a:t>Public </a:t>
-            </a:r>
-            <a:r>
-              <a:rPr lang="en-US" sz="1200" dirty="0" err="1"/>
-              <a:t>ip</a:t>
-            </a:r>
-            <a:r>
-              <a:rPr lang="en-US" sz="1200" dirty="0"/>
-              <a:t>: </a:t>
-            </a:r>
-            <a:r>
-              <a:rPr lang="en-US" sz="1200" dirty="0" err="1"/>
-              <a:t>w.x.y.x</a:t>
-            </a:r>
             <a:endParaRPr lang="en-US" sz="1200" dirty="0"/>
           </a:p>
         </p:txBody>
@@ -30298,7 +30251,7 @@
         </p:nvSpPr>
         <p:spPr>
           <a:xfrm>
-            <a:off x="8746569" y="2942061"/>
+            <a:off x="8746569" y="2706091"/>
             <a:ext cx="538162" cy="341232"/>
           </a:xfrm>
           <a:prstGeom prst="leftArrow">
@@ -30605,7 +30558,7 @@
           <a:p>
             <a:r>
               <a:rPr lang="en-US" sz="1600" dirty="0"/>
-              <a:t>We’ll use the azure-cli command line tools to create a new storage account and container in your subscription, copy the source </a:t>
+              <a:t>We’ll use the Azure CLI command line tools to create a new storage account and container in your subscription, copy the source </a:t>
             </a:r>
             <a:r>
               <a:rPr lang="en-US" sz="1600" dirty="0" err="1"/>
@@ -30722,10 +30675,89 @@
           </a:p>
         </p:txBody>
       </p:sp>
+      <p:sp>
+        <p:nvSpPr>
+          <p:cNvPr id="94" name="Rectangle: Rounded Corners 93"/>
+          <p:cNvSpPr/>
+          <p:nvPr/>
+        </p:nvSpPr>
+        <p:spPr>
+          <a:xfrm>
+            <a:off x="7048507" y="3111845"/>
+            <a:ext cx="1899762" cy="446914"/>
+          </a:xfrm>
+          <a:prstGeom prst="roundRect">
+            <a:avLst>
+              <a:gd name="adj" fmla="val 34197"/>
+            </a:avLst>
+          </a:prstGeom>
+          <a:solidFill>
+            <a:schemeClr val="bg1"/>
+          </a:solidFill>
+          <a:ln>
+            <a:solidFill>
+              <a:schemeClr val="accent1"/>
+            </a:solidFill>
+          </a:ln>
+        </p:spPr>
+        <p:style>
+          <a:lnRef idx="2">
+            <a:schemeClr val="accent1">
+              <a:shade val="50000"/>
+            </a:schemeClr>
+          </a:lnRef>
+          <a:fillRef idx="1">
+            <a:schemeClr val="accent1"/>
+          </a:fillRef>
+          <a:effectRef idx="0">
+            <a:schemeClr val="accent1"/>
+          </a:effectRef>
+          <a:fontRef idx="minor">
+            <a:schemeClr val="lt1"/>
+          </a:fontRef>
+        </p:style>
+        <p:txBody>
+          <a:bodyPr rtlCol="0" anchor="ctr"/>
+          <a:lstStyle/>
+          <a:p>
+            <a:r>
+              <a:rPr lang="en-US" sz="1200" b="1" i="1" dirty="0">
+                <a:solidFill>
+                  <a:sysClr val="windowText" lastClr="000000"/>
+                </a:solidFill>
+              </a:rPr>
+              <a:t>&lt;name&gt;</a:t>
+            </a:r>
+            <a:r>
+              <a:rPr lang="en-US" sz="1200" b="1" dirty="0" err="1">
+                <a:solidFill>
+                  <a:sysClr val="windowText" lastClr="000000"/>
+                </a:solidFill>
+              </a:rPr>
+              <a:t>ip</a:t>
+            </a:r>
+            <a:br>
+              <a:rPr lang="en-US" sz="1200" b="1" dirty="0">
+                <a:solidFill>
+                  <a:sysClr val="windowText" lastClr="000000"/>
+                </a:solidFill>
+              </a:rPr>
+            </a:br>
+            <a:r>
+              <a:rPr lang="en-US" sz="1200" b="1" dirty="0">
+                <a:solidFill>
+                  <a:sysClr val="windowText" lastClr="000000"/>
+                </a:solidFill>
+              </a:rPr>
+              <a:t>Public IP address</a:t>
+            </a:r>
+          </a:p>
+        </p:txBody>
+      </p:sp>
     </p:spTree>
     <p:extLst>
       <p:ext uri="{BB962C8B-B14F-4D97-AF65-F5344CB8AC3E}">
-        <p14:creationId xmlns:p14="http://schemas.microsoft.com/office/powerpoint/2010/main" val="1385698675"/>
+        <p14:creationId xmlns:p14="http://schemas.microsoft.com/office/powerpoint/2010/main" val="1874019749"/>
       </p:ext>
     </p:extLst>
   </p:cSld>

</xml_diff>